<commit_message>
[Update T2S matrix multiply tutorial UREs and ppt]
</commit_message>
<xml_diff>
--- a/main/QuickStartGuides/T2S/tutorials/fpga/matrix-multiply/basic/figures/matrix-multiply-dataflow.pptx
+++ b/main/QuickStartGuides/T2S/tutorials/fpga/matrix-multiply/basic/figures/matrix-multiply-dataflow.pptx
@@ -281,7 +281,7 @@
           <a:p>
             <a:fld id="{584616ED-DCD8-4DD3-BCA5-86C7BBC6EA45}" type="datetimeFigureOut">
               <a:rPr lang="en-US" smtClean="0"/>
-              <a:t>5/11/2021</a:t>
+              <a:t>5/15/2021</a:t>
             </a:fld>
             <a:endParaRPr lang="en-US"/>
           </a:p>
@@ -479,7 +479,7 @@
           <a:p>
             <a:fld id="{584616ED-DCD8-4DD3-BCA5-86C7BBC6EA45}" type="datetimeFigureOut">
               <a:rPr lang="en-US" smtClean="0"/>
-              <a:t>5/11/2021</a:t>
+              <a:t>5/15/2021</a:t>
             </a:fld>
             <a:endParaRPr lang="en-US"/>
           </a:p>
@@ -687,7 +687,7 @@
           <a:p>
             <a:fld id="{584616ED-DCD8-4DD3-BCA5-86C7BBC6EA45}" type="datetimeFigureOut">
               <a:rPr lang="en-US" smtClean="0"/>
-              <a:t>5/11/2021</a:t>
+              <a:t>5/15/2021</a:t>
             </a:fld>
             <a:endParaRPr lang="en-US"/>
           </a:p>
@@ -885,7 +885,7 @@
           <a:p>
             <a:fld id="{584616ED-DCD8-4DD3-BCA5-86C7BBC6EA45}" type="datetimeFigureOut">
               <a:rPr lang="en-US" smtClean="0"/>
-              <a:t>5/11/2021</a:t>
+              <a:t>5/15/2021</a:t>
             </a:fld>
             <a:endParaRPr lang="en-US"/>
           </a:p>
@@ -1160,7 +1160,7 @@
           <a:p>
             <a:fld id="{584616ED-DCD8-4DD3-BCA5-86C7BBC6EA45}" type="datetimeFigureOut">
               <a:rPr lang="en-US" smtClean="0"/>
-              <a:t>5/11/2021</a:t>
+              <a:t>5/15/2021</a:t>
             </a:fld>
             <a:endParaRPr lang="en-US"/>
           </a:p>
@@ -1425,7 +1425,7 @@
           <a:p>
             <a:fld id="{584616ED-DCD8-4DD3-BCA5-86C7BBC6EA45}" type="datetimeFigureOut">
               <a:rPr lang="en-US" smtClean="0"/>
-              <a:t>5/11/2021</a:t>
+              <a:t>5/15/2021</a:t>
             </a:fld>
             <a:endParaRPr lang="en-US"/>
           </a:p>
@@ -1837,7 +1837,7 @@
           <a:p>
             <a:fld id="{584616ED-DCD8-4DD3-BCA5-86C7BBC6EA45}" type="datetimeFigureOut">
               <a:rPr lang="en-US" smtClean="0"/>
-              <a:t>5/11/2021</a:t>
+              <a:t>5/15/2021</a:t>
             </a:fld>
             <a:endParaRPr lang="en-US"/>
           </a:p>
@@ -1978,7 +1978,7 @@
           <a:p>
             <a:fld id="{584616ED-DCD8-4DD3-BCA5-86C7BBC6EA45}" type="datetimeFigureOut">
               <a:rPr lang="en-US" smtClean="0"/>
-              <a:t>5/11/2021</a:t>
+              <a:t>5/15/2021</a:t>
             </a:fld>
             <a:endParaRPr lang="en-US"/>
           </a:p>
@@ -2091,7 +2091,7 @@
           <a:p>
             <a:fld id="{584616ED-DCD8-4DD3-BCA5-86C7BBC6EA45}" type="datetimeFigureOut">
               <a:rPr lang="en-US" smtClean="0"/>
-              <a:t>5/11/2021</a:t>
+              <a:t>5/15/2021</a:t>
             </a:fld>
             <a:endParaRPr lang="en-US"/>
           </a:p>
@@ -2402,7 +2402,7 @@
           <a:p>
             <a:fld id="{584616ED-DCD8-4DD3-BCA5-86C7BBC6EA45}" type="datetimeFigureOut">
               <a:rPr lang="en-US" smtClean="0"/>
-              <a:t>5/11/2021</a:t>
+              <a:t>5/15/2021</a:t>
             </a:fld>
             <a:endParaRPr lang="en-US"/>
           </a:p>
@@ -2690,7 +2690,7 @@
           <a:p>
             <a:fld id="{584616ED-DCD8-4DD3-BCA5-86C7BBC6EA45}" type="datetimeFigureOut">
               <a:rPr lang="en-US" smtClean="0"/>
-              <a:t>5/11/2021</a:t>
+              <a:t>5/15/2021</a:t>
             </a:fld>
             <a:endParaRPr lang="en-US"/>
           </a:p>
@@ -2931,7 +2931,7 @@
           <a:p>
             <a:fld id="{584616ED-DCD8-4DD3-BCA5-86C7BBC6EA45}" type="datetimeFigureOut">
               <a:rPr lang="en-US" smtClean="0"/>
-              <a:t>5/11/2021</a:t>
+              <a:t>5/15/2021</a:t>
             </a:fld>
             <a:endParaRPr lang="en-US"/>
           </a:p>
@@ -8951,7 +8951,7 @@
                                           </p:stCondLst>
                                         </p:cTn>
                                         <p:tgtEl>
-                                          <p:spTgt spid="138"/>
+                                          <p:spTgt spid="62"/>
                                         </p:tgtEl>
                                         <p:attrNameLst>
                                           <p:attrName>style.visibility</p:attrName>
@@ -8978,7 +8978,7 @@
                                           </p:stCondLst>
                                         </p:cTn>
                                         <p:tgtEl>
-                                          <p:spTgt spid="62"/>
+                                          <p:spTgt spid="63"/>
                                         </p:tgtEl>
                                         <p:attrNameLst>
                                           <p:attrName>style.visibility</p:attrName>
@@ -8992,7 +8992,7 @@
                                 </p:cTn>
                               </p:par>
                               <p:par>
-                                <p:cTn id="9" presetID="1" presetClass="exit" presetSubtype="0" fill="hold" grpId="0" nodeType="withEffect">
+                                <p:cTn id="9" presetID="1" presetClass="exit" presetSubtype="0" fill="hold" nodeType="withEffect">
                                   <p:stCondLst>
                                     <p:cond delay="0"/>
                                   </p:stCondLst>
@@ -9005,7 +9005,7 @@
                                           </p:stCondLst>
                                         </p:cTn>
                                         <p:tgtEl>
-                                          <p:spTgt spid="63"/>
+                                          <p:spTgt spid="151"/>
                                         </p:tgtEl>
                                         <p:attrNameLst>
                                           <p:attrName>style.visibility</p:attrName>
@@ -9032,7 +9032,7 @@
                                           </p:stCondLst>
                                         </p:cTn>
                                         <p:tgtEl>
-                                          <p:spTgt spid="66"/>
+                                          <p:spTgt spid="182"/>
                                         </p:tgtEl>
                                         <p:attrNameLst>
                                           <p:attrName>style.visibility</p:attrName>
@@ -9046,7 +9046,7 @@
                                 </p:cTn>
                               </p:par>
                               <p:par>
-                                <p:cTn id="13" presetID="1" presetClass="exit" presetSubtype="0" fill="hold" nodeType="withEffect">
+                                <p:cTn id="13" presetID="1" presetClass="exit" presetSubtype="0" fill="hold" grpId="0" nodeType="withEffect">
                                   <p:stCondLst>
                                     <p:cond delay="0"/>
                                   </p:stCondLst>
@@ -9059,7 +9059,7 @@
                                           </p:stCondLst>
                                         </p:cTn>
                                         <p:tgtEl>
-                                          <p:spTgt spid="151"/>
+                                          <p:spTgt spid="183"/>
                                         </p:tgtEl>
                                         <p:attrNameLst>
                                           <p:attrName>style.visibility</p:attrName>
@@ -9086,7 +9086,7 @@
                                           </p:stCondLst>
                                         </p:cTn>
                                         <p:tgtEl>
-                                          <p:spTgt spid="152"/>
+                                          <p:spTgt spid="199"/>
                                         </p:tgtEl>
                                         <p:attrNameLst>
                                           <p:attrName>style.visibility</p:attrName>
@@ -9113,7 +9113,7 @@
                                           </p:stCondLst>
                                         </p:cTn>
                                         <p:tgtEl>
-                                          <p:spTgt spid="181"/>
+                                          <p:spTgt spid="23"/>
                                         </p:tgtEl>
                                         <p:attrNameLst>
                                           <p:attrName>style.visibility</p:attrName>
@@ -9140,168 +9140,6 @@
                                           </p:stCondLst>
                                         </p:cTn>
                                         <p:tgtEl>
-                                          <p:spTgt spid="182"/>
-                                        </p:tgtEl>
-                                        <p:attrNameLst>
-                                          <p:attrName>style.visibility</p:attrName>
-                                        </p:attrNameLst>
-                                      </p:cBhvr>
-                                      <p:to>
-                                        <p:strVal val="hidden"/>
-                                      </p:to>
-                                    </p:set>
-                                  </p:childTnLst>
-                                </p:cTn>
-                              </p:par>
-                              <p:par>
-                                <p:cTn id="21" presetID="1" presetClass="exit" presetSubtype="0" fill="hold" grpId="0" nodeType="withEffect">
-                                  <p:stCondLst>
-                                    <p:cond delay="0"/>
-                                  </p:stCondLst>
-                                  <p:childTnLst>
-                                    <p:set>
-                                      <p:cBhvr>
-                                        <p:cTn id="22" dur="1" fill="hold">
-                                          <p:stCondLst>
-                                            <p:cond delay="0"/>
-                                          </p:stCondLst>
-                                        </p:cTn>
-                                        <p:tgtEl>
-                                          <p:spTgt spid="183"/>
-                                        </p:tgtEl>
-                                        <p:attrNameLst>
-                                          <p:attrName>style.visibility</p:attrName>
-                                        </p:attrNameLst>
-                                      </p:cBhvr>
-                                      <p:to>
-                                        <p:strVal val="hidden"/>
-                                      </p:to>
-                                    </p:set>
-                                  </p:childTnLst>
-                                </p:cTn>
-                              </p:par>
-                              <p:par>
-                                <p:cTn id="23" presetID="1" presetClass="exit" presetSubtype="0" fill="hold" grpId="0" nodeType="withEffect">
-                                  <p:stCondLst>
-                                    <p:cond delay="0"/>
-                                  </p:stCondLst>
-                                  <p:childTnLst>
-                                    <p:set>
-                                      <p:cBhvr>
-                                        <p:cTn id="24" dur="1" fill="hold">
-                                          <p:stCondLst>
-                                            <p:cond delay="0"/>
-                                          </p:stCondLst>
-                                        </p:cTn>
-                                        <p:tgtEl>
-                                          <p:spTgt spid="184"/>
-                                        </p:tgtEl>
-                                        <p:attrNameLst>
-                                          <p:attrName>style.visibility</p:attrName>
-                                        </p:attrNameLst>
-                                      </p:cBhvr>
-                                      <p:to>
-                                        <p:strVal val="hidden"/>
-                                      </p:to>
-                                    </p:set>
-                                  </p:childTnLst>
-                                </p:cTn>
-                              </p:par>
-                              <p:par>
-                                <p:cTn id="25" presetID="1" presetClass="exit" presetSubtype="0" fill="hold" nodeType="withEffect">
-                                  <p:stCondLst>
-                                    <p:cond delay="0"/>
-                                  </p:stCondLst>
-                                  <p:childTnLst>
-                                    <p:set>
-                                      <p:cBhvr>
-                                        <p:cTn id="26" dur="1" fill="hold">
-                                          <p:stCondLst>
-                                            <p:cond delay="0"/>
-                                          </p:stCondLst>
-                                        </p:cTn>
-                                        <p:tgtEl>
-                                          <p:spTgt spid="199"/>
-                                        </p:tgtEl>
-                                        <p:attrNameLst>
-                                          <p:attrName>style.visibility</p:attrName>
-                                        </p:attrNameLst>
-                                      </p:cBhvr>
-                                      <p:to>
-                                        <p:strVal val="hidden"/>
-                                      </p:to>
-                                    </p:set>
-                                  </p:childTnLst>
-                                </p:cTn>
-                              </p:par>
-                              <p:par>
-                                <p:cTn id="27" presetID="1" presetClass="exit" presetSubtype="0" fill="hold" nodeType="withEffect">
-                                  <p:stCondLst>
-                                    <p:cond delay="0"/>
-                                  </p:stCondLst>
-                                  <p:childTnLst>
-                                    <p:set>
-                                      <p:cBhvr>
-                                        <p:cTn id="28" dur="1" fill="hold">
-                                          <p:stCondLst>
-                                            <p:cond delay="0"/>
-                                          </p:stCondLst>
-                                        </p:cTn>
-                                        <p:tgtEl>
-                                          <p:spTgt spid="201"/>
-                                        </p:tgtEl>
-                                        <p:attrNameLst>
-                                          <p:attrName>style.visibility</p:attrName>
-                                        </p:attrNameLst>
-                                      </p:cBhvr>
-                                      <p:to>
-                                        <p:strVal val="hidden"/>
-                                      </p:to>
-                                    </p:set>
-                                  </p:childTnLst>
-                                </p:cTn>
-                              </p:par>
-                              <p:par>
-                                <p:cTn id="29" presetID="1" presetClass="exit" presetSubtype="0" fill="hold" grpId="0" nodeType="withEffect">
-                                  <p:stCondLst>
-                                    <p:cond delay="0"/>
-                                  </p:stCondLst>
-                                  <p:childTnLst>
-                                    <p:set>
-                                      <p:cBhvr>
-                                        <p:cTn id="30" dur="1" fill="hold">
-                                          <p:stCondLst>
-                                            <p:cond delay="0"/>
-                                          </p:stCondLst>
-                                        </p:cTn>
-                                        <p:tgtEl>
-                                          <p:spTgt spid="23"/>
-                                        </p:tgtEl>
-                                        <p:attrNameLst>
-                                          <p:attrName>style.visibility</p:attrName>
-                                        </p:attrNameLst>
-                                      </p:cBhvr>
-                                      <p:to>
-                                        <p:strVal val="hidden"/>
-                                      </p:to>
-                                    </p:set>
-                                  </p:childTnLst>
-                                </p:cTn>
-                              </p:par>
-                              <p:par>
-                                <p:cTn id="31" presetID="1" presetClass="exit" presetSubtype="0" fill="hold" grpId="0" nodeType="withEffect">
-                                  <p:stCondLst>
-                                    <p:cond delay="0"/>
-                                  </p:stCondLst>
-                                  <p:childTnLst>
-                                    <p:set>
-                                      <p:cBhvr>
-                                        <p:cTn id="32" dur="1" fill="hold">
-                                          <p:stCondLst>
-                                            <p:cond delay="0"/>
-                                          </p:stCondLst>
-                                        </p:cTn>
-                                        <p:tgtEl>
                                           <p:spTgt spid="24"/>
                                         </p:tgtEl>
                                         <p:attrNameLst>
@@ -9316,101 +9154,20 @@
                                 </p:cTn>
                               </p:par>
                               <p:par>
-                                <p:cTn id="33" presetID="1" presetClass="exit" presetSubtype="0" fill="hold" nodeType="withEffect">
+                                <p:cTn id="21" presetID="1" presetClass="exit" presetSubtype="0" fill="hold" nodeType="withEffect">
                                   <p:stCondLst>
                                     <p:cond delay="0"/>
                                   </p:stCondLst>
                                   <p:childTnLst>
                                     <p:set>
                                       <p:cBhvr>
-                                        <p:cTn id="34" dur="1" fill="hold">
+                                        <p:cTn id="22" dur="1" fill="hold">
                                           <p:stCondLst>
                                             <p:cond delay="0"/>
                                           </p:stCondLst>
                                         </p:cTn>
                                         <p:tgtEl>
                                           <p:spTgt spid="28"/>
-                                        </p:tgtEl>
-                                        <p:attrNameLst>
-                                          <p:attrName>style.visibility</p:attrName>
-                                        </p:attrNameLst>
-                                      </p:cBhvr>
-                                      <p:to>
-                                        <p:strVal val="hidden"/>
-                                      </p:to>
-                                    </p:set>
-                                  </p:childTnLst>
-                                </p:cTn>
-                              </p:par>
-                              <p:par>
-                                <p:cTn id="35" presetID="1" presetClass="exit" presetSubtype="0" fill="hold" nodeType="withEffect">
-                                  <p:stCondLst>
-                                    <p:cond delay="0"/>
-                                  </p:stCondLst>
-                                  <p:childTnLst>
-                                    <p:set>
-                                      <p:cBhvr>
-                                        <p:cTn id="36" dur="1" fill="hold">
-                                          <p:stCondLst>
-                                            <p:cond delay="0"/>
-                                          </p:stCondLst>
-                                        </p:cTn>
-                                        <p:tgtEl>
-                                          <p:spTgt spid="31"/>
-                                        </p:tgtEl>
-                                        <p:attrNameLst>
-                                          <p:attrName>style.visibility</p:attrName>
-                                        </p:attrNameLst>
-                                      </p:cBhvr>
-                                      <p:to>
-                                        <p:strVal val="hidden"/>
-                                      </p:to>
-                                    </p:set>
-                                  </p:childTnLst>
-                                </p:cTn>
-                              </p:par>
-                              <p:par>
-                                <p:cTn id="37" presetID="1" presetClass="exit" presetSubtype="0" fill="hold" grpId="0" nodeType="withEffect">
-                                  <p:stCondLst>
-                                    <p:cond delay="0"/>
-                                  </p:stCondLst>
-                                  <p:childTnLst>
-                                    <p:set>
-                                      <p:cBhvr>
-                                        <p:cTn id="38" dur="1" fill="hold">
-                                          <p:stCondLst>
-                                            <p:cond delay="0"/>
-                                          </p:stCondLst>
-                                        </p:cTn>
-                                        <p:tgtEl>
-                                          <p:spTgt spid="39"/>
-                                        </p:tgtEl>
-                                        <p:attrNameLst>
-                                          <p:attrName>style.visibility</p:attrName>
-                                        </p:attrNameLst>
-                                      </p:cBhvr>
-                                      <p:to>
-                                        <p:strVal val="hidden"/>
-                                      </p:to>
-                                    </p:set>
-                                  </p:childTnLst>
-                                </p:cTn>
-                              </p:par>
-                              <p:par>
-                                <p:cTn id="39" presetID="1" presetClass="exit" presetSubtype="0" fill="hold" grpId="0" nodeType="withEffect">
-                                  <p:stCondLst>
-                                    <p:cond delay="0"/>
-                                  </p:stCondLst>
-                                  <p:childTnLst>
-                                    <p:set>
-                                      <p:cBhvr>
-                                        <p:cTn id="40" dur="1" fill="hold">
-                                          <p:stCondLst>
-                                            <p:cond delay="0"/>
-                                          </p:stCondLst>
-                                        </p:cTn>
-                                        <p:tgtEl>
-                                          <p:spTgt spid="30"/>
                                         </p:tgtEl>
                                         <p:attrNameLst>
                                           <p:attrName>style.visibility</p:attrName>
@@ -9430,26 +9187,26 @@
                     </p:cTn>
                   </p:par>
                   <p:par>
-                    <p:cTn id="41" fill="hold">
+                    <p:cTn id="23" fill="hold">
                       <p:stCondLst>
                         <p:cond delay="indefinite"/>
                       </p:stCondLst>
                       <p:childTnLst>
                         <p:par>
-                          <p:cTn id="42" fill="hold">
+                          <p:cTn id="24" fill="hold">
                             <p:stCondLst>
                               <p:cond delay="0"/>
                             </p:stCondLst>
                             <p:childTnLst>
                               <p:par>
-                                <p:cTn id="43" presetID="1" presetClass="entr" presetSubtype="0" fill="hold" grpId="0" nodeType="clickEffect">
+                                <p:cTn id="25" presetID="1" presetClass="entr" presetSubtype="0" fill="hold" grpId="0" nodeType="clickEffect">
                                   <p:stCondLst>
                                     <p:cond delay="0"/>
                                   </p:stCondLst>
                                   <p:childTnLst>
                                     <p:set>
                                       <p:cBhvr>
-                                        <p:cTn id="44" dur="1" fill="hold">
+                                        <p:cTn id="26" dur="1" fill="hold">
                                           <p:stCondLst>
                                             <p:cond delay="0"/>
                                           </p:stCondLst>
@@ -9475,26 +9232,26 @@
                     </p:cTn>
                   </p:par>
                   <p:par>
-                    <p:cTn id="45" fill="hold">
+                    <p:cTn id="27" fill="hold">
                       <p:stCondLst>
                         <p:cond delay="indefinite"/>
                       </p:stCondLst>
                       <p:childTnLst>
                         <p:par>
-                          <p:cTn id="46" fill="hold">
+                          <p:cTn id="28" fill="hold">
                             <p:stCondLst>
                               <p:cond delay="0"/>
                             </p:stCondLst>
                             <p:childTnLst>
                               <p:par>
-                                <p:cTn id="47" presetID="1" presetClass="entr" presetSubtype="0" fill="hold" grpId="0" nodeType="clickEffect">
+                                <p:cTn id="29" presetID="1" presetClass="entr" presetSubtype="0" fill="hold" grpId="0" nodeType="clickEffect">
                                   <p:stCondLst>
                                     <p:cond delay="0"/>
                                   </p:stCondLst>
                                   <p:childTnLst>
                                     <p:set>
                                       <p:cBhvr>
-                                        <p:cTn id="48" dur="1" fill="hold">
+                                        <p:cTn id="30" dur="1" fill="hold">
                                           <p:stCondLst>
                                             <p:cond delay="0"/>
                                           </p:stCondLst>
@@ -9520,26 +9277,26 @@
                     </p:cTn>
                   </p:par>
                   <p:par>
-                    <p:cTn id="49" fill="hold">
+                    <p:cTn id="31" fill="hold">
                       <p:stCondLst>
                         <p:cond delay="indefinite"/>
                       </p:stCondLst>
                       <p:childTnLst>
                         <p:par>
-                          <p:cTn id="50" fill="hold">
+                          <p:cTn id="32" fill="hold">
                             <p:stCondLst>
                               <p:cond delay="0"/>
                             </p:stCondLst>
                             <p:childTnLst>
                               <p:par>
-                                <p:cTn id="51" presetID="1" presetClass="entr" presetSubtype="0" fill="hold" grpId="0" nodeType="clickEffect">
+                                <p:cTn id="33" presetID="1" presetClass="entr" presetSubtype="0" fill="hold" grpId="0" nodeType="clickEffect">
                                   <p:stCondLst>
                                     <p:cond delay="0"/>
                                   </p:stCondLst>
                                   <p:childTnLst>
                                     <p:set>
                                       <p:cBhvr>
-                                        <p:cTn id="52" dur="1" fill="hold">
+                                        <p:cTn id="34" dur="1" fill="hold">
                                           <p:stCondLst>
                                             <p:cond delay="0"/>
                                           </p:stCondLst>
@@ -9565,26 +9322,26 @@
                     </p:cTn>
                   </p:par>
                   <p:par>
-                    <p:cTn id="53" fill="hold">
+                    <p:cTn id="35" fill="hold">
                       <p:stCondLst>
                         <p:cond delay="indefinite"/>
                       </p:stCondLst>
                       <p:childTnLst>
                         <p:par>
-                          <p:cTn id="54" fill="hold">
+                          <p:cTn id="36" fill="hold">
                             <p:stCondLst>
                               <p:cond delay="0"/>
                             </p:stCondLst>
                             <p:childTnLst>
                               <p:par>
-                                <p:cTn id="55" presetID="1" presetClass="entr" presetSubtype="0" fill="hold" grpId="0" nodeType="clickEffect">
+                                <p:cTn id="37" presetID="1" presetClass="entr" presetSubtype="0" fill="hold" grpId="0" nodeType="clickEffect">
                                   <p:stCondLst>
                                     <p:cond delay="0"/>
                                   </p:stCondLst>
                                   <p:childTnLst>
                                     <p:set>
                                       <p:cBhvr>
-                                        <p:cTn id="56" dur="1" fill="hold">
+                                        <p:cTn id="38" dur="1" fill="hold">
                                           <p:stCondLst>
                                             <p:cond delay="0"/>
                                           </p:stCondLst>
@@ -9610,26 +9367,26 @@
                     </p:cTn>
                   </p:par>
                   <p:par>
-                    <p:cTn id="57" fill="hold">
+                    <p:cTn id="39" fill="hold">
                       <p:stCondLst>
                         <p:cond delay="indefinite"/>
                       </p:stCondLst>
                       <p:childTnLst>
                         <p:par>
-                          <p:cTn id="58" fill="hold">
+                          <p:cTn id="40" fill="hold">
                             <p:stCondLst>
                               <p:cond delay="0"/>
                             </p:stCondLst>
                             <p:childTnLst>
                               <p:par>
-                                <p:cTn id="59" presetID="1" presetClass="entr" presetSubtype="0" fill="hold" grpId="0" nodeType="clickEffect">
+                                <p:cTn id="41" presetID="1" presetClass="entr" presetSubtype="0" fill="hold" grpId="0" nodeType="clickEffect">
                                   <p:stCondLst>
                                     <p:cond delay="0"/>
                                   </p:stCondLst>
                                   <p:childTnLst>
                                     <p:set>
                                       <p:cBhvr>
-                                        <p:cTn id="60" dur="1" fill="hold">
+                                        <p:cTn id="42" dur="1" fill="hold">
                                           <p:stCondLst>
                                             <p:cond delay="0"/>
                                           </p:stCondLst>
@@ -9655,26 +9412,26 @@
                     </p:cTn>
                   </p:par>
                   <p:par>
-                    <p:cTn id="61" fill="hold">
+                    <p:cTn id="43" fill="hold">
                       <p:stCondLst>
                         <p:cond delay="indefinite"/>
                       </p:stCondLst>
                       <p:childTnLst>
                         <p:par>
-                          <p:cTn id="62" fill="hold">
+                          <p:cTn id="44" fill="hold">
                             <p:stCondLst>
                               <p:cond delay="0"/>
                             </p:stCondLst>
                             <p:childTnLst>
                               <p:par>
-                                <p:cTn id="63" presetID="1" presetClass="entr" presetSubtype="0" fill="hold" grpId="0" nodeType="clickEffect">
+                                <p:cTn id="45" presetID="1" presetClass="entr" presetSubtype="0" fill="hold" grpId="0" nodeType="clickEffect">
                                   <p:stCondLst>
                                     <p:cond delay="0"/>
                                   </p:stCondLst>
                                   <p:childTnLst>
                                     <p:set>
                                       <p:cBhvr>
-                                        <p:cTn id="64" dur="1" fill="hold">
+                                        <p:cTn id="46" dur="1" fill="hold">
                                           <p:stCondLst>
                                             <p:cond delay="0"/>
                                           </p:stCondLst>
@@ -9700,26 +9457,26 @@
                     </p:cTn>
                   </p:par>
                   <p:par>
-                    <p:cTn id="65" fill="hold">
+                    <p:cTn id="47" fill="hold">
                       <p:stCondLst>
                         <p:cond delay="indefinite"/>
                       </p:stCondLst>
                       <p:childTnLst>
                         <p:par>
-                          <p:cTn id="66" fill="hold">
+                          <p:cTn id="48" fill="hold">
                             <p:stCondLst>
                               <p:cond delay="0"/>
                             </p:stCondLst>
                             <p:childTnLst>
                               <p:par>
-                                <p:cTn id="67" presetID="1" presetClass="entr" presetSubtype="0" fill="hold" grpId="0" nodeType="clickEffect">
+                                <p:cTn id="49" presetID="1" presetClass="entr" presetSubtype="0" fill="hold" grpId="0" nodeType="clickEffect">
                                   <p:stCondLst>
                                     <p:cond delay="0"/>
                                   </p:stCondLst>
                                   <p:childTnLst>
                                     <p:set>
                                       <p:cBhvr>
-                                        <p:cTn id="68" dur="1" fill="hold">
+                                        <p:cTn id="50" dur="1" fill="hold">
                                           <p:stCondLst>
                                             <p:cond delay="0"/>
                                           </p:stCondLst>
@@ -9745,26 +9502,26 @@
                     </p:cTn>
                   </p:par>
                   <p:par>
-                    <p:cTn id="69" fill="hold">
+                    <p:cTn id="51" fill="hold">
                       <p:stCondLst>
                         <p:cond delay="indefinite"/>
                       </p:stCondLst>
                       <p:childTnLst>
                         <p:par>
-                          <p:cTn id="70" fill="hold">
+                          <p:cTn id="52" fill="hold">
                             <p:stCondLst>
                               <p:cond delay="0"/>
                             </p:stCondLst>
                             <p:childTnLst>
                               <p:par>
-                                <p:cTn id="71" presetID="1" presetClass="entr" presetSubtype="0" fill="hold" grpId="0" nodeType="clickEffect">
+                                <p:cTn id="53" presetID="1" presetClass="entr" presetSubtype="0" fill="hold" grpId="0" nodeType="clickEffect">
                                   <p:stCondLst>
                                     <p:cond delay="0"/>
                                   </p:stCondLst>
                                   <p:childTnLst>
                                     <p:set>
                                       <p:cBhvr>
-                                        <p:cTn id="72" dur="1" fill="hold">
+                                        <p:cTn id="54" dur="1" fill="hold">
                                           <p:stCondLst>
                                             <p:cond delay="0"/>
                                           </p:stCondLst>
@@ -9790,26 +9547,26 @@
                     </p:cTn>
                   </p:par>
                   <p:par>
-                    <p:cTn id="73" fill="hold">
+                    <p:cTn id="55" fill="hold">
                       <p:stCondLst>
                         <p:cond delay="indefinite"/>
                       </p:stCondLst>
                       <p:childTnLst>
                         <p:par>
-                          <p:cTn id="74" fill="hold">
+                          <p:cTn id="56" fill="hold">
                             <p:stCondLst>
                               <p:cond delay="0"/>
                             </p:stCondLst>
                             <p:childTnLst>
                               <p:par>
-                                <p:cTn id="75" presetID="1" presetClass="entr" presetSubtype="0" fill="hold" grpId="0" nodeType="clickEffect">
+                                <p:cTn id="57" presetID="1" presetClass="entr" presetSubtype="0" fill="hold" grpId="0" nodeType="clickEffect">
                                   <p:stCondLst>
                                     <p:cond delay="0"/>
                                   </p:stCondLst>
                                   <p:childTnLst>
                                     <p:set>
                                       <p:cBhvr>
-                                        <p:cTn id="76" dur="1" fill="hold">
+                                        <p:cTn id="58" dur="1" fill="hold">
                                           <p:stCondLst>
                                             <p:cond delay="0"/>
                                           </p:stCondLst>
@@ -9835,26 +9592,26 @@
                     </p:cTn>
                   </p:par>
                   <p:par>
-                    <p:cTn id="77" fill="hold">
+                    <p:cTn id="59" fill="hold">
                       <p:stCondLst>
                         <p:cond delay="indefinite"/>
                       </p:stCondLst>
                       <p:childTnLst>
                         <p:par>
-                          <p:cTn id="78" fill="hold">
+                          <p:cTn id="60" fill="hold">
                             <p:stCondLst>
                               <p:cond delay="0"/>
                             </p:stCondLst>
                             <p:childTnLst>
                               <p:par>
-                                <p:cTn id="79" presetID="22" presetClass="entr" presetSubtype="1" fill="hold" grpId="0" nodeType="clickEffect">
+                                <p:cTn id="61" presetID="22" presetClass="entr" presetSubtype="1" fill="hold" grpId="0" nodeType="clickEffect">
                                   <p:stCondLst>
                                     <p:cond delay="0"/>
                                   </p:stCondLst>
                                   <p:childTnLst>
                                     <p:set>
                                       <p:cBhvr>
-                                        <p:cTn id="80" dur="1" fill="hold">
+                                        <p:cTn id="62" dur="1" fill="hold">
                                           <p:stCondLst>
                                             <p:cond delay="0"/>
                                           </p:stCondLst>
@@ -9872,7 +9629,7 @@
                                     </p:set>
                                     <p:animEffect transition="in" filter="wipe(up)">
                                       <p:cBhvr>
-                                        <p:cTn id="81" dur="500"/>
+                                        <p:cTn id="63" dur="500"/>
                                         <p:tgtEl>
                                           <p:spTgt spid="51"/>
                                         </p:tgtEl>
@@ -9909,18 +9666,12 @@
       </p:par>
     </p:tnLst>
     <p:bldLst>
-      <p:bldP spid="138" grpId="0"/>
       <p:bldP spid="62" grpId="0" animBg="1"/>
       <p:bldP spid="63" grpId="0" animBg="1"/>
-      <p:bldP spid="66" grpId="0"/>
-      <p:bldP spid="181" grpId="0"/>
       <p:bldP spid="182" grpId="0" animBg="1"/>
       <p:bldP spid="183" grpId="0" animBg="1"/>
-      <p:bldP spid="184" grpId="0"/>
       <p:bldP spid="23" grpId="0" animBg="1"/>
       <p:bldP spid="24" grpId="0" animBg="1"/>
-      <p:bldP spid="39" grpId="0"/>
-      <p:bldP spid="30" grpId="0"/>
       <p:bldP spid="34" grpId="0"/>
       <p:bldP spid="37" grpId="0"/>
       <p:bldP spid="38" grpId="0"/>
@@ -12715,11 +12466,11 @@
   <p:clrMapOvr>
     <a:masterClrMapping/>
   </p:clrMapOvr>
-  <mc:AlternateContent xmlns:mc="http://schemas.openxmlformats.org/markup-compatibility/2006">
-    <mc:Choice xmlns:p14="http://schemas.microsoft.com/office/powerpoint/2010/main" Requires="p14">
+  <mc:AlternateContent xmlns:mc="http://schemas.openxmlformats.org/markup-compatibility/2006" xmlns:p14="http://schemas.microsoft.com/office/powerpoint/2010/main">
+    <mc:Choice Requires="p14">
       <p:transition spd="slow" p14:dur="2000" advTm="11024"/>
     </mc:Choice>
-    <mc:Fallback>
+    <mc:Fallback xmlns="">
       <p:transition spd="slow" advTm="11024"/>
     </mc:Fallback>
   </mc:AlternateContent>

</xml_diff>